<commit_message>
adds discussion on considerations of ANNs
</commit_message>
<xml_diff>
--- a/08-Intro-to-PyTorch/intro/Intro-to-PyTorch.pptx
+++ b/08-Intro-to-PyTorch/intro/Intro-to-PyTorch.pptx
@@ -5,21 +5,23 @@
     <p:sldMasterId id="2147483648" r:id="rId1"/>
   </p:sldMasterIdLst>
   <p:notesMasterIdLst>
-    <p:notesMasterId r:id="rId11"/>
+    <p:notesMasterId r:id="rId13"/>
   </p:notesMasterIdLst>
   <p:handoutMasterIdLst>
-    <p:handoutMasterId r:id="rId12"/>
+    <p:handoutMasterId r:id="rId14"/>
   </p:handoutMasterIdLst>
   <p:sldIdLst>
     <p:sldId id="295" r:id="rId2"/>
     <p:sldId id="284" r:id="rId3"/>
     <p:sldId id="307" r:id="rId4"/>
-    <p:sldId id="262" r:id="rId5"/>
-    <p:sldId id="303" r:id="rId6"/>
-    <p:sldId id="298" r:id="rId7"/>
-    <p:sldId id="299" r:id="rId8"/>
-    <p:sldId id="304" r:id="rId9"/>
-    <p:sldId id="296" r:id="rId10"/>
+    <p:sldId id="308" r:id="rId5"/>
+    <p:sldId id="309" r:id="rId6"/>
+    <p:sldId id="262" r:id="rId7"/>
+    <p:sldId id="303" r:id="rId8"/>
+    <p:sldId id="298" r:id="rId9"/>
+    <p:sldId id="299" r:id="rId10"/>
+    <p:sldId id="304" r:id="rId11"/>
+    <p:sldId id="296" r:id="rId12"/>
   </p:sldIdLst>
   <p:sldSz cx="12192000" cy="6858000"/>
   <p:notesSz cx="6858000" cy="9144000"/>
@@ -3961,7 +3963,7 @@
           <a:p>
             <a:fld id="{0EF05BAA-92F6-4DEA-A832-E4B15A2F525C}" type="slidenum">
               <a:rPr lang="en-AU" smtClean="0"/>
-              <a:t>4</a:t>
+              <a:t>6</a:t>
             </a:fld>
             <a:endParaRPr lang="en-AU"/>
           </a:p>
@@ -13890,13 +13892,380 @@
   <p:clrMapOvr>
     <a:masterClrMapping/>
   </p:clrMapOvr>
-  <mc:AlternateContent xmlns:mc="http://schemas.openxmlformats.org/markup-compatibility/2006">
-    <mc:Choice xmlns:p14="http://schemas.microsoft.com/office/powerpoint/2010/main" Requires="p14">
+  <mc:AlternateContent xmlns:mc="http://schemas.openxmlformats.org/markup-compatibility/2006" xmlns:p14="http://schemas.microsoft.com/office/powerpoint/2010/main">
+    <mc:Choice Requires="p14">
       <p:transition spd="med" p14:dur="700">
         <p:fade/>
       </p:transition>
     </mc:Choice>
-    <mc:Fallback>
+    <mc:Fallback xmlns="">
+      <p:transition spd="med">
+        <p:fade/>
+      </p:transition>
+    </mc:Fallback>
+  </mc:AlternateContent>
+</p:sld>
+</file>
+
+<file path=ppt/slides/slide10.xml><?xml version="1.0" encoding="utf-8"?>
+<p:sld xmlns:a="http://schemas.openxmlformats.org/drawingml/2006/main" xmlns:r="http://schemas.openxmlformats.org/officeDocument/2006/relationships" xmlns:p="http://schemas.openxmlformats.org/presentationml/2006/main">
+  <p:cSld>
+    <p:spTree>
+      <p:nvGrpSpPr>
+        <p:cNvPr id="1" name=""/>
+        <p:cNvGrpSpPr/>
+        <p:nvPr/>
+      </p:nvGrpSpPr>
+      <p:grpSpPr>
+        <a:xfrm>
+          <a:off x="0" y="0"/>
+          <a:ext cx="0" cy="0"/>
+          <a:chOff x="0" y="0"/>
+          <a:chExt cx="0" cy="0"/>
+        </a:xfrm>
+      </p:grpSpPr>
+      <p:sp>
+        <p:nvSpPr>
+          <p:cNvPr id="2" name="Content Placeholder 1">
+            <a:extLst>
+              <a:ext uri="{FF2B5EF4-FFF2-40B4-BE49-F238E27FC236}">
+                <a16:creationId xmlns:a16="http://schemas.microsoft.com/office/drawing/2014/main" id="{D47CAEB2-2A3D-DC5C-3574-8D79CBE07BB9}"/>
+              </a:ext>
+            </a:extLst>
+          </p:cNvPr>
+          <p:cNvSpPr>
+            <a:spLocks noGrp="1"/>
+          </p:cNvSpPr>
+          <p:nvPr>
+            <p:ph sz="quarter" idx="11"/>
+          </p:nvPr>
+        </p:nvSpPr>
+        <p:spPr/>
+        <p:txBody>
+          <a:bodyPr>
+            <a:normAutofit fontScale="85000" lnSpcReduction="20000"/>
+          </a:bodyPr>
+          <a:lstStyle/>
+          <a:p>
+            <a:pPr marL="0" indent="0">
+              <a:buNone/>
+            </a:pPr>
+            <a:r>
+              <a:rPr lang="en-US" dirty="0"/>
+              <a:t>Project website:</a:t>
+            </a:r>
+            <a:endParaRPr lang="en-US" dirty="0">
+              <a:hlinkClick r:id="rId2"/>
+            </a:endParaRPr>
+          </a:p>
+          <a:p>
+            <a:pPr marL="0" indent="0" algn="ctr">
+              <a:buNone/>
+            </a:pPr>
+            <a:r>
+              <a:rPr lang="en-US" dirty="0">
+                <a:hlinkClick r:id="rId3"/>
+              </a:rPr>
+              <a:t>https://pytorch.org/</a:t>
+            </a:r>
+            <a:endParaRPr lang="en-US" dirty="0"/>
+          </a:p>
+          <a:p>
+            <a:pPr marL="457200" indent="-457200"/>
+            <a:r>
+              <a:rPr lang="en-US" dirty="0"/>
+              <a:t>Installation guide</a:t>
+            </a:r>
+          </a:p>
+          <a:p>
+            <a:pPr marL="457200" indent="-457200"/>
+            <a:r>
+              <a:rPr lang="en-US" dirty="0"/>
+              <a:t>Good tutorials (sometimes outdated)</a:t>
+            </a:r>
+          </a:p>
+          <a:p>
+            <a:pPr marL="457200" indent="-457200"/>
+            <a:r>
+              <a:rPr lang="en-US" dirty="0"/>
+              <a:t>API reference</a:t>
+            </a:r>
+          </a:p>
+          <a:p>
+            <a:pPr marL="457200" indent="-457200"/>
+            <a:r>
+              <a:rPr lang="en-US" dirty="0"/>
+              <a:t>Examples</a:t>
+            </a:r>
+          </a:p>
+          <a:p>
+            <a:pPr marL="457200" indent="-457200"/>
+            <a:r>
+              <a:rPr lang="en-US" dirty="0"/>
+              <a:t>Community</a:t>
+            </a:r>
+          </a:p>
+          <a:p>
+            <a:pPr marL="457200" indent="-457200"/>
+            <a:r>
+              <a:rPr lang="en-US" dirty="0"/>
+              <a:t>…</a:t>
+            </a:r>
+          </a:p>
+          <a:p>
+            <a:pPr marL="0" indent="0" algn="ctr">
+              <a:buNone/>
+            </a:pPr>
+            <a:endParaRPr lang="en-US" dirty="0"/>
+          </a:p>
+          <a:p>
+            <a:endParaRPr lang="en-US" dirty="0"/>
+          </a:p>
+        </p:txBody>
+      </p:sp>
+      <p:sp>
+        <p:nvSpPr>
+          <p:cNvPr id="3" name="Title 2">
+            <a:extLst>
+              <a:ext uri="{FF2B5EF4-FFF2-40B4-BE49-F238E27FC236}">
+                <a16:creationId xmlns:a16="http://schemas.microsoft.com/office/drawing/2014/main" id="{56133F61-F965-7D00-90B8-B15BAE9FDF66}"/>
+              </a:ext>
+            </a:extLst>
+          </p:cNvPr>
+          <p:cNvSpPr>
+            <a:spLocks noGrp="1"/>
+          </p:cNvSpPr>
+          <p:nvPr>
+            <p:ph type="title"/>
+          </p:nvPr>
+        </p:nvSpPr>
+        <p:spPr/>
+        <p:txBody>
+          <a:bodyPr/>
+          <a:lstStyle/>
+          <a:p>
+            <a:r>
+              <a:rPr lang="en-US" dirty="0" err="1"/>
+              <a:t>PyTorch</a:t>
+            </a:r>
+            <a:r>
+              <a:rPr lang="en-US" dirty="0"/>
+              <a:t> at a glance</a:t>
+            </a:r>
+          </a:p>
+        </p:txBody>
+      </p:sp>
+      <p:sp>
+        <p:nvSpPr>
+          <p:cNvPr id="4" name="Footer Placeholder 3">
+            <a:extLst>
+              <a:ext uri="{FF2B5EF4-FFF2-40B4-BE49-F238E27FC236}">
+                <a16:creationId xmlns:a16="http://schemas.microsoft.com/office/drawing/2014/main" id="{81469498-3274-9CE5-0E60-8E948217173C}"/>
+              </a:ext>
+            </a:extLst>
+          </p:cNvPr>
+          <p:cNvSpPr>
+            <a:spLocks noGrp="1"/>
+          </p:cNvSpPr>
+          <p:nvPr>
+            <p:ph type="ftr" sz="quarter" idx="12"/>
+          </p:nvPr>
+        </p:nvSpPr>
+        <p:spPr/>
+        <p:txBody>
+          <a:bodyPr/>
+          <a:lstStyle/>
+          <a:p>
+            <a:pPr algn="ctr"/>
+            <a:r>
+              <a:rPr lang="en-AU" dirty="0"/>
+              <a:t>Intro to PyTorch</a:t>
+            </a:r>
+          </a:p>
+        </p:txBody>
+      </p:sp>
+      <p:sp>
+        <p:nvSpPr>
+          <p:cNvPr id="5" name="Slide Number Placeholder 4">
+            <a:extLst>
+              <a:ext uri="{FF2B5EF4-FFF2-40B4-BE49-F238E27FC236}">
+                <a16:creationId xmlns:a16="http://schemas.microsoft.com/office/drawing/2014/main" id="{E3369252-1038-5180-4BA4-C479494753E0}"/>
+              </a:ext>
+            </a:extLst>
+          </p:cNvPr>
+          <p:cNvSpPr>
+            <a:spLocks noGrp="1"/>
+          </p:cNvSpPr>
+          <p:nvPr>
+            <p:ph type="sldNum" sz="quarter" idx="13"/>
+          </p:nvPr>
+        </p:nvSpPr>
+        <p:spPr/>
+        <p:txBody>
+          <a:bodyPr/>
+          <a:lstStyle/>
+          <a:p>
+            <a:fld id="{E917DE0E-AFB1-41FD-BC35-27DB61CA125F}" type="slidenum">
+              <a:rPr lang="en-AU" smtClean="0"/>
+              <a:pPr/>
+              <a:t>10</a:t>
+            </a:fld>
+            <a:endParaRPr lang="en-AU" dirty="0"/>
+          </a:p>
+        </p:txBody>
+      </p:sp>
+    </p:spTree>
+    <p:extLst>
+      <p:ext uri="{BB962C8B-B14F-4D97-AF65-F5344CB8AC3E}">
+        <p14:creationId xmlns:p14="http://schemas.microsoft.com/office/powerpoint/2010/main" val="2818603005"/>
+      </p:ext>
+    </p:extLst>
+  </p:cSld>
+  <p:clrMapOvr>
+    <a:masterClrMapping/>
+  </p:clrMapOvr>
+  <mc:AlternateContent xmlns:mc="http://schemas.openxmlformats.org/markup-compatibility/2006" xmlns:p14="http://schemas.microsoft.com/office/powerpoint/2010/main">
+    <mc:Choice Requires="p14">
+      <p:transition spd="med" p14:dur="700">
+        <p:fade/>
+      </p:transition>
+    </mc:Choice>
+    <mc:Fallback xmlns="">
+      <p:transition spd="med">
+        <p:fade/>
+      </p:transition>
+    </mc:Fallback>
+  </mc:AlternateContent>
+</p:sld>
+</file>
+
+<file path=ppt/slides/slide11.xml><?xml version="1.0" encoding="utf-8"?>
+<p:sld xmlns:a="http://schemas.openxmlformats.org/drawingml/2006/main" xmlns:r="http://schemas.openxmlformats.org/officeDocument/2006/relationships" xmlns:p="http://schemas.openxmlformats.org/presentationml/2006/main">
+  <p:cSld>
+    <p:spTree>
+      <p:nvGrpSpPr>
+        <p:cNvPr id="1" name=""/>
+        <p:cNvGrpSpPr/>
+        <p:nvPr/>
+      </p:nvGrpSpPr>
+      <p:grpSpPr>
+        <a:xfrm>
+          <a:off x="0" y="0"/>
+          <a:ext cx="0" cy="0"/>
+          <a:chOff x="0" y="0"/>
+          <a:chExt cx="0" cy="0"/>
+        </a:xfrm>
+      </p:grpSpPr>
+      <p:sp>
+        <p:nvSpPr>
+          <p:cNvPr id="10" name="Title 9">
+            <a:extLst>
+              <a:ext uri="{FF2B5EF4-FFF2-40B4-BE49-F238E27FC236}">
+                <a16:creationId xmlns:a16="http://schemas.microsoft.com/office/drawing/2014/main" id="{18D359ED-81E1-4152-B5FF-BC60446F6E05}"/>
+              </a:ext>
+            </a:extLst>
+          </p:cNvPr>
+          <p:cNvSpPr>
+            <a:spLocks noGrp="1"/>
+          </p:cNvSpPr>
+          <p:nvPr>
+            <p:ph type="title"/>
+          </p:nvPr>
+        </p:nvSpPr>
+        <p:spPr>
+          <a:xfrm>
+            <a:off x="381000" y="2772655"/>
+            <a:ext cx="10059418" cy="1312691"/>
+          </a:xfrm>
+        </p:spPr>
+        <p:txBody>
+          <a:bodyPr/>
+          <a:lstStyle/>
+          <a:p>
+            <a:pPr algn="l"/>
+            <a:r>
+              <a:rPr lang="en-AU" dirty="0"/>
+              <a:t>Let’s get started…</a:t>
+            </a:r>
+          </a:p>
+        </p:txBody>
+      </p:sp>
+      <p:sp>
+        <p:nvSpPr>
+          <p:cNvPr id="5" name="Footer Placeholder 4">
+            <a:extLst>
+              <a:ext uri="{FF2B5EF4-FFF2-40B4-BE49-F238E27FC236}">
+                <a16:creationId xmlns:a16="http://schemas.microsoft.com/office/drawing/2014/main" id="{2AB3A763-8648-4E79-A29B-28D21C7710A9}"/>
+              </a:ext>
+            </a:extLst>
+          </p:cNvPr>
+          <p:cNvSpPr>
+            <a:spLocks noGrp="1"/>
+          </p:cNvSpPr>
+          <p:nvPr>
+            <p:ph type="ftr" sz="quarter" idx="11"/>
+          </p:nvPr>
+        </p:nvSpPr>
+        <p:spPr/>
+        <p:txBody>
+          <a:bodyPr/>
+          <a:lstStyle/>
+          <a:p>
+            <a:pPr algn="ctr"/>
+            <a:r>
+              <a:rPr lang="en-AU" dirty="0"/>
+              <a:t>Intro to PyTorch</a:t>
+            </a:r>
+          </a:p>
+        </p:txBody>
+      </p:sp>
+      <p:sp>
+        <p:nvSpPr>
+          <p:cNvPr id="6" name="Slide Number Placeholder 5">
+            <a:extLst>
+              <a:ext uri="{FF2B5EF4-FFF2-40B4-BE49-F238E27FC236}">
+                <a16:creationId xmlns:a16="http://schemas.microsoft.com/office/drawing/2014/main" id="{8BE61673-B619-48AC-86E7-428A4A84EFC8}"/>
+              </a:ext>
+            </a:extLst>
+          </p:cNvPr>
+          <p:cNvSpPr>
+            <a:spLocks noGrp="1"/>
+          </p:cNvSpPr>
+          <p:nvPr>
+            <p:ph type="sldNum" sz="quarter" idx="12"/>
+          </p:nvPr>
+        </p:nvSpPr>
+        <p:spPr/>
+        <p:txBody>
+          <a:bodyPr/>
+          <a:lstStyle/>
+          <a:p>
+            <a:fld id="{E917DE0E-AFB1-41FD-BC35-27DB61CA125F}" type="slidenum">
+              <a:rPr lang="en-AU" smtClean="0"/>
+              <a:pPr/>
+              <a:t>11</a:t>
+            </a:fld>
+            <a:endParaRPr lang="en-AU" dirty="0"/>
+          </a:p>
+        </p:txBody>
+      </p:sp>
+    </p:spTree>
+    <p:extLst>
+      <p:ext uri="{BB962C8B-B14F-4D97-AF65-F5344CB8AC3E}">
+        <p14:creationId xmlns:p14="http://schemas.microsoft.com/office/powerpoint/2010/main" val="2185817615"/>
+      </p:ext>
+    </p:extLst>
+  </p:cSld>
+  <p:clrMapOvr>
+    <a:masterClrMapping/>
+  </p:clrMapOvr>
+  <mc:AlternateContent xmlns:mc="http://schemas.openxmlformats.org/markup-compatibility/2006" xmlns:p14="http://schemas.microsoft.com/office/powerpoint/2010/main">
+    <mc:Choice Requires="p14">
+      <p:transition spd="med" p14:dur="700">
+        <p:fade/>
+      </p:transition>
+    </mc:Choice>
+    <mc:Fallback xmlns="">
       <p:transition spd="med">
         <p:fade/>
       </p:transition>
@@ -14332,13 +14701,13 @@
   <p:clrMapOvr>
     <a:masterClrMapping/>
   </p:clrMapOvr>
-  <mc:AlternateContent xmlns:mc="http://schemas.openxmlformats.org/markup-compatibility/2006">
-    <mc:Choice xmlns:p14="http://schemas.microsoft.com/office/powerpoint/2010/main" Requires="p14">
+  <mc:AlternateContent xmlns:mc="http://schemas.openxmlformats.org/markup-compatibility/2006" xmlns:p14="http://schemas.microsoft.com/office/powerpoint/2010/main">
+    <mc:Choice Requires="p14">
       <p:transition spd="med" p14:dur="700">
         <p:fade/>
       </p:transition>
     </mc:Choice>
-    <mc:Fallback>
+    <mc:Fallback xmlns="">
       <p:transition spd="med">
         <p:fade/>
       </p:transition>
@@ -14644,8 +15013,13 @@
             <a:pPr algn="ctr"/>
             <a:r>
               <a:rPr lang="en-AU" dirty="0"/>
-              <a:t>Intro to Machine Learning with scikit-learn</a:t>
-            </a:r>
+              <a:t>Intro to </a:t>
+            </a:r>
+            <a:r>
+              <a:rPr lang="en-AU" dirty="0" err="1"/>
+              <a:t>PyTorch</a:t>
+            </a:r>
+            <a:endParaRPr lang="en-AU" dirty="0"/>
           </a:p>
         </p:txBody>
       </p:sp>
@@ -15192,13 +15566,13 @@
   <p:clrMapOvr>
     <a:masterClrMapping/>
   </p:clrMapOvr>
-  <mc:AlternateContent xmlns:mc="http://schemas.openxmlformats.org/markup-compatibility/2006">
-    <mc:Choice xmlns:p14="http://schemas.microsoft.com/office/powerpoint/2010/main" Requires="p14">
+  <mc:AlternateContent xmlns:mc="http://schemas.openxmlformats.org/markup-compatibility/2006" xmlns:p14="http://schemas.microsoft.com/office/powerpoint/2010/main">
+    <mc:Choice Requires="p14">
       <p:transition spd="med" p14:dur="700">
         <p:fade/>
       </p:transition>
     </mc:Choice>
-    <mc:Fallback>
+    <mc:Fallback xmlns="">
       <p:transition spd="med">
         <p:fade/>
       </p:transition>
@@ -15312,6 +15686,1011 @@
       </p:grpSpPr>
       <p:sp>
         <p:nvSpPr>
+          <p:cNvPr id="5" name="Content Placeholder 4">
+            <a:extLst>
+              <a:ext uri="{FF2B5EF4-FFF2-40B4-BE49-F238E27FC236}">
+                <a16:creationId xmlns:a16="http://schemas.microsoft.com/office/drawing/2014/main" id="{A7C919EB-5E81-F4F3-6E9B-D138E9AEC4AE}"/>
+              </a:ext>
+            </a:extLst>
+          </p:cNvPr>
+          <p:cNvSpPr>
+            <a:spLocks noGrp="1"/>
+          </p:cNvSpPr>
+          <p:nvPr>
+            <p:ph sz="quarter" idx="11"/>
+          </p:nvPr>
+        </p:nvSpPr>
+        <p:spPr/>
+        <p:txBody>
+          <a:bodyPr/>
+          <a:lstStyle/>
+          <a:p>
+            <a:pPr marL="466725" indent="-457200">
+              <a:buFont typeface="System Font Regular"/>
+              <a:buChar char="🤖"/>
+            </a:pPr>
+            <a:r>
+              <a:rPr lang="en-US" dirty="0"/>
+              <a:t>(Artificial) Neural Networks are a family of machine learning techniques</a:t>
+            </a:r>
+          </a:p>
+          <a:p>
+            <a:pPr marL="466725" indent="-457200">
+              <a:buFont typeface="System Font Regular"/>
+              <a:buChar char="🧠"/>
+            </a:pPr>
+            <a:r>
+              <a:rPr lang="en-US" dirty="0"/>
+              <a:t>They are </a:t>
+            </a:r>
+            <a:r>
+              <a:rPr lang="en-US" dirty="0">
+                <a:latin typeface="National 2 Medium" panose="020B0504030502020203" pitchFamily="34" charset="77"/>
+              </a:rPr>
+              <a:t>very loosely </a:t>
+            </a:r>
+            <a:r>
+              <a:rPr lang="en-US" dirty="0"/>
+              <a:t>inspired by the human brain</a:t>
+            </a:r>
+          </a:p>
+          <a:p>
+            <a:pPr marL="466725" indent="-457200">
+              <a:buFont typeface="System Font Regular"/>
+              <a:buChar char="☝️"/>
+            </a:pPr>
+            <a:r>
+              <a:rPr lang="en-US" dirty="0"/>
+              <a:t>All aspects of machine learning still apply (over- and underfitting, hyperparameter training, evaluation techniques, …)</a:t>
+            </a:r>
+          </a:p>
+          <a:p>
+            <a:pPr marL="466725" indent="-457200">
+              <a:buFont typeface="System Font Regular"/>
+              <a:buChar char="💪"/>
+            </a:pPr>
+            <a:r>
+              <a:rPr lang="en-US" dirty="0"/>
+              <a:t>Neural Networks are universal function approximators that (given enough data) can model any mapping (including non-linear)</a:t>
+            </a:r>
+          </a:p>
+          <a:p>
+            <a:pPr marL="182563" indent="-173038"/>
+            <a:endParaRPr lang="en-US" dirty="0"/>
+          </a:p>
+          <a:p>
+            <a:endParaRPr lang="en-US" dirty="0"/>
+          </a:p>
+          <a:p>
+            <a:endParaRPr lang="en-US" dirty="0"/>
+          </a:p>
+        </p:txBody>
+      </p:sp>
+      <p:sp>
+        <p:nvSpPr>
+          <p:cNvPr id="3" name="Title 2">
+            <a:extLst>
+              <a:ext uri="{FF2B5EF4-FFF2-40B4-BE49-F238E27FC236}">
+                <a16:creationId xmlns:a16="http://schemas.microsoft.com/office/drawing/2014/main" id="{4311126D-03FA-CDED-5617-B50F11413CAD}"/>
+              </a:ext>
+            </a:extLst>
+          </p:cNvPr>
+          <p:cNvSpPr>
+            <a:spLocks noGrp="1"/>
+          </p:cNvSpPr>
+          <p:nvPr>
+            <p:ph type="title"/>
+          </p:nvPr>
+        </p:nvSpPr>
+        <p:spPr/>
+        <p:txBody>
+          <a:bodyPr>
+            <a:normAutofit fontScale="90000"/>
+          </a:bodyPr>
+          <a:lstStyle/>
+          <a:p>
+            <a:r>
+              <a:rPr lang="en-US" dirty="0"/>
+              <a:t>Conventional Machine Learning and Neural Networks</a:t>
+            </a:r>
+          </a:p>
+        </p:txBody>
+      </p:sp>
+      <p:sp>
+        <p:nvSpPr>
+          <p:cNvPr id="4" name="Slide Number Placeholder 3">
+            <a:extLst>
+              <a:ext uri="{FF2B5EF4-FFF2-40B4-BE49-F238E27FC236}">
+                <a16:creationId xmlns:a16="http://schemas.microsoft.com/office/drawing/2014/main" id="{C5A70088-0E73-BA91-B45F-9B5F7BA6AF07}"/>
+              </a:ext>
+            </a:extLst>
+          </p:cNvPr>
+          <p:cNvSpPr>
+            <a:spLocks noGrp="1"/>
+          </p:cNvSpPr>
+          <p:nvPr>
+            <p:ph type="sldNum" sz="quarter" idx="13"/>
+          </p:nvPr>
+        </p:nvSpPr>
+        <p:spPr/>
+        <p:txBody>
+          <a:bodyPr/>
+          <a:lstStyle/>
+          <a:p>
+            <a:fld id="{E917DE0E-AFB1-41FD-BC35-27DB61CA125F}" type="slidenum">
+              <a:rPr lang="en-AU" smtClean="0"/>
+              <a:pPr/>
+              <a:t>4</a:t>
+            </a:fld>
+            <a:endParaRPr lang="en-AU" dirty="0"/>
+          </a:p>
+        </p:txBody>
+      </p:sp>
+      <p:sp>
+        <p:nvSpPr>
+          <p:cNvPr id="7" name="Footer Placeholder 5">
+            <a:extLst>
+              <a:ext uri="{FF2B5EF4-FFF2-40B4-BE49-F238E27FC236}">
+                <a16:creationId xmlns:a16="http://schemas.microsoft.com/office/drawing/2014/main" id="{86920D94-EBE7-F987-22B9-93BECCE068D8}"/>
+              </a:ext>
+            </a:extLst>
+          </p:cNvPr>
+          <p:cNvSpPr>
+            <a:spLocks noGrp="1"/>
+          </p:cNvSpPr>
+          <p:nvPr>
+            <p:ph type="ftr" sz="quarter" idx="12"/>
+          </p:nvPr>
+        </p:nvSpPr>
+        <p:spPr>
+          <a:xfrm>
+            <a:off x="2383047" y="184261"/>
+            <a:ext cx="7425906" cy="217125"/>
+          </a:xfrm>
+        </p:spPr>
+        <p:txBody>
+          <a:bodyPr/>
+          <a:lstStyle/>
+          <a:p>
+            <a:r>
+              <a:rPr lang="en-AU" dirty="0"/>
+              <a:t>Intro to PyTorch</a:t>
+            </a:r>
+          </a:p>
+        </p:txBody>
+      </p:sp>
+    </p:spTree>
+    <p:extLst>
+      <p:ext uri="{BB962C8B-B14F-4D97-AF65-F5344CB8AC3E}">
+        <p14:creationId xmlns:p14="http://schemas.microsoft.com/office/powerpoint/2010/main" val="1133449061"/>
+      </p:ext>
+    </p:extLst>
+  </p:cSld>
+  <p:clrMapOvr>
+    <a:masterClrMapping/>
+  </p:clrMapOvr>
+  <mc:AlternateContent xmlns:mc="http://schemas.openxmlformats.org/markup-compatibility/2006" xmlns:p14="http://schemas.microsoft.com/office/powerpoint/2010/main">
+    <mc:Choice Requires="p14">
+      <p:transition spd="med" p14:dur="700">
+        <p:fade/>
+      </p:transition>
+    </mc:Choice>
+    <mc:Fallback xmlns="">
+      <p:transition spd="med">
+        <p:fade/>
+      </p:transition>
+    </mc:Fallback>
+  </mc:AlternateContent>
+  <p:timing>
+    <p:tnLst>
+      <p:par>
+        <p:cTn id="1" dur="indefinite" restart="never" nodeType="tmRoot">
+          <p:childTnLst>
+            <p:seq concurrent="1" nextAc="seek">
+              <p:cTn id="2" dur="indefinite" nodeType="mainSeq">
+                <p:childTnLst>
+                  <p:par>
+                    <p:cTn id="3" fill="hold">
+                      <p:stCondLst>
+                        <p:cond delay="indefinite"/>
+                      </p:stCondLst>
+                      <p:childTnLst>
+                        <p:par>
+                          <p:cTn id="4" fill="hold">
+                            <p:stCondLst>
+                              <p:cond delay="0"/>
+                            </p:stCondLst>
+                            <p:childTnLst>
+                              <p:par>
+                                <p:cTn id="5" presetID="10" presetClass="entr" presetSubtype="0" fill="hold" grpId="0" nodeType="clickEffect">
+                                  <p:stCondLst>
+                                    <p:cond delay="0"/>
+                                  </p:stCondLst>
+                                  <p:childTnLst>
+                                    <p:set>
+                                      <p:cBhvr>
+                                        <p:cTn id="6" dur="1" fill="hold">
+                                          <p:stCondLst>
+                                            <p:cond delay="0"/>
+                                          </p:stCondLst>
+                                        </p:cTn>
+                                        <p:tgtEl>
+                                          <p:spTgt spid="5">
+                                            <p:txEl>
+                                              <p:pRg st="0" end="0"/>
+                                            </p:txEl>
+                                          </p:spTgt>
+                                        </p:tgtEl>
+                                        <p:attrNameLst>
+                                          <p:attrName>style.visibility</p:attrName>
+                                        </p:attrNameLst>
+                                      </p:cBhvr>
+                                      <p:to>
+                                        <p:strVal val="visible"/>
+                                      </p:to>
+                                    </p:set>
+                                    <p:animEffect transition="in" filter="fade">
+                                      <p:cBhvr>
+                                        <p:cTn id="7" dur="500"/>
+                                        <p:tgtEl>
+                                          <p:spTgt spid="5">
+                                            <p:txEl>
+                                              <p:pRg st="0" end="0"/>
+                                            </p:txEl>
+                                          </p:spTgt>
+                                        </p:tgtEl>
+                                      </p:cBhvr>
+                                    </p:animEffect>
+                                  </p:childTnLst>
+                                </p:cTn>
+                              </p:par>
+                            </p:childTnLst>
+                          </p:cTn>
+                        </p:par>
+                      </p:childTnLst>
+                    </p:cTn>
+                  </p:par>
+                  <p:par>
+                    <p:cTn id="8" fill="hold">
+                      <p:stCondLst>
+                        <p:cond delay="indefinite"/>
+                      </p:stCondLst>
+                      <p:childTnLst>
+                        <p:par>
+                          <p:cTn id="9" fill="hold">
+                            <p:stCondLst>
+                              <p:cond delay="0"/>
+                            </p:stCondLst>
+                            <p:childTnLst>
+                              <p:par>
+                                <p:cTn id="10" presetID="10" presetClass="entr" presetSubtype="0" fill="hold" grpId="0" nodeType="clickEffect">
+                                  <p:stCondLst>
+                                    <p:cond delay="0"/>
+                                  </p:stCondLst>
+                                  <p:childTnLst>
+                                    <p:set>
+                                      <p:cBhvr>
+                                        <p:cTn id="11" dur="1" fill="hold">
+                                          <p:stCondLst>
+                                            <p:cond delay="0"/>
+                                          </p:stCondLst>
+                                        </p:cTn>
+                                        <p:tgtEl>
+                                          <p:spTgt spid="5">
+                                            <p:txEl>
+                                              <p:pRg st="1" end="1"/>
+                                            </p:txEl>
+                                          </p:spTgt>
+                                        </p:tgtEl>
+                                        <p:attrNameLst>
+                                          <p:attrName>style.visibility</p:attrName>
+                                        </p:attrNameLst>
+                                      </p:cBhvr>
+                                      <p:to>
+                                        <p:strVal val="visible"/>
+                                      </p:to>
+                                    </p:set>
+                                    <p:animEffect transition="in" filter="fade">
+                                      <p:cBhvr>
+                                        <p:cTn id="12" dur="500"/>
+                                        <p:tgtEl>
+                                          <p:spTgt spid="5">
+                                            <p:txEl>
+                                              <p:pRg st="1" end="1"/>
+                                            </p:txEl>
+                                          </p:spTgt>
+                                        </p:tgtEl>
+                                      </p:cBhvr>
+                                    </p:animEffect>
+                                  </p:childTnLst>
+                                </p:cTn>
+                              </p:par>
+                            </p:childTnLst>
+                          </p:cTn>
+                        </p:par>
+                      </p:childTnLst>
+                    </p:cTn>
+                  </p:par>
+                  <p:par>
+                    <p:cTn id="13" fill="hold">
+                      <p:stCondLst>
+                        <p:cond delay="indefinite"/>
+                      </p:stCondLst>
+                      <p:childTnLst>
+                        <p:par>
+                          <p:cTn id="14" fill="hold">
+                            <p:stCondLst>
+                              <p:cond delay="0"/>
+                            </p:stCondLst>
+                            <p:childTnLst>
+                              <p:par>
+                                <p:cTn id="15" presetID="10" presetClass="entr" presetSubtype="0" fill="hold" grpId="0" nodeType="clickEffect">
+                                  <p:stCondLst>
+                                    <p:cond delay="0"/>
+                                  </p:stCondLst>
+                                  <p:childTnLst>
+                                    <p:set>
+                                      <p:cBhvr>
+                                        <p:cTn id="16" dur="1" fill="hold">
+                                          <p:stCondLst>
+                                            <p:cond delay="0"/>
+                                          </p:stCondLst>
+                                        </p:cTn>
+                                        <p:tgtEl>
+                                          <p:spTgt spid="5">
+                                            <p:txEl>
+                                              <p:pRg st="2" end="2"/>
+                                            </p:txEl>
+                                          </p:spTgt>
+                                        </p:tgtEl>
+                                        <p:attrNameLst>
+                                          <p:attrName>style.visibility</p:attrName>
+                                        </p:attrNameLst>
+                                      </p:cBhvr>
+                                      <p:to>
+                                        <p:strVal val="visible"/>
+                                      </p:to>
+                                    </p:set>
+                                    <p:animEffect transition="in" filter="fade">
+                                      <p:cBhvr>
+                                        <p:cTn id="17" dur="500"/>
+                                        <p:tgtEl>
+                                          <p:spTgt spid="5">
+                                            <p:txEl>
+                                              <p:pRg st="2" end="2"/>
+                                            </p:txEl>
+                                          </p:spTgt>
+                                        </p:tgtEl>
+                                      </p:cBhvr>
+                                    </p:animEffect>
+                                  </p:childTnLst>
+                                </p:cTn>
+                              </p:par>
+                            </p:childTnLst>
+                          </p:cTn>
+                        </p:par>
+                      </p:childTnLst>
+                    </p:cTn>
+                  </p:par>
+                  <p:par>
+                    <p:cTn id="18" fill="hold">
+                      <p:stCondLst>
+                        <p:cond delay="indefinite"/>
+                      </p:stCondLst>
+                      <p:childTnLst>
+                        <p:par>
+                          <p:cTn id="19" fill="hold">
+                            <p:stCondLst>
+                              <p:cond delay="0"/>
+                            </p:stCondLst>
+                            <p:childTnLst>
+                              <p:par>
+                                <p:cTn id="20" presetID="10" presetClass="entr" presetSubtype="0" fill="hold" grpId="0" nodeType="clickEffect">
+                                  <p:stCondLst>
+                                    <p:cond delay="0"/>
+                                  </p:stCondLst>
+                                  <p:childTnLst>
+                                    <p:set>
+                                      <p:cBhvr>
+                                        <p:cTn id="21" dur="1" fill="hold">
+                                          <p:stCondLst>
+                                            <p:cond delay="0"/>
+                                          </p:stCondLst>
+                                        </p:cTn>
+                                        <p:tgtEl>
+                                          <p:spTgt spid="5">
+                                            <p:txEl>
+                                              <p:pRg st="3" end="3"/>
+                                            </p:txEl>
+                                          </p:spTgt>
+                                        </p:tgtEl>
+                                        <p:attrNameLst>
+                                          <p:attrName>style.visibility</p:attrName>
+                                        </p:attrNameLst>
+                                      </p:cBhvr>
+                                      <p:to>
+                                        <p:strVal val="visible"/>
+                                      </p:to>
+                                    </p:set>
+                                    <p:animEffect transition="in" filter="fade">
+                                      <p:cBhvr>
+                                        <p:cTn id="22" dur="500"/>
+                                        <p:tgtEl>
+                                          <p:spTgt spid="5">
+                                            <p:txEl>
+                                              <p:pRg st="3" end="3"/>
+                                            </p:txEl>
+                                          </p:spTgt>
+                                        </p:tgtEl>
+                                      </p:cBhvr>
+                                    </p:animEffect>
+                                  </p:childTnLst>
+                                </p:cTn>
+                              </p:par>
+                            </p:childTnLst>
+                          </p:cTn>
+                        </p:par>
+                      </p:childTnLst>
+                    </p:cTn>
+                  </p:par>
+                </p:childTnLst>
+              </p:cTn>
+              <p:prevCondLst>
+                <p:cond evt="onPrev" delay="0">
+                  <p:tgtEl>
+                    <p:sldTgt/>
+                  </p:tgtEl>
+                </p:cond>
+              </p:prevCondLst>
+              <p:nextCondLst>
+                <p:cond evt="onNext" delay="0">
+                  <p:tgtEl>
+                    <p:sldTgt/>
+                  </p:tgtEl>
+                </p:cond>
+              </p:nextCondLst>
+            </p:seq>
+          </p:childTnLst>
+        </p:cTn>
+      </p:par>
+    </p:tnLst>
+    <p:bldLst>
+      <p:bldP spid="5" grpId="0" build="p"/>
+    </p:bldLst>
+  </p:timing>
+</p:sld>
+</file>
+
+<file path=ppt/slides/slide5.xml><?xml version="1.0" encoding="utf-8"?>
+<p:sld xmlns:a="http://schemas.openxmlformats.org/drawingml/2006/main" xmlns:r="http://schemas.openxmlformats.org/officeDocument/2006/relationships" xmlns:p="http://schemas.openxmlformats.org/presentationml/2006/main">
+  <p:cSld>
+    <p:spTree>
+      <p:nvGrpSpPr>
+        <p:cNvPr id="1" name=""/>
+        <p:cNvGrpSpPr/>
+        <p:nvPr/>
+      </p:nvGrpSpPr>
+      <p:grpSpPr>
+        <a:xfrm>
+          <a:off x="0" y="0"/>
+          <a:ext cx="0" cy="0"/>
+          <a:chOff x="0" y="0"/>
+          <a:chExt cx="0" cy="0"/>
+        </a:xfrm>
+      </p:grpSpPr>
+      <p:sp>
+        <p:nvSpPr>
+          <p:cNvPr id="5" name="Content Placeholder 4">
+            <a:extLst>
+              <a:ext uri="{FF2B5EF4-FFF2-40B4-BE49-F238E27FC236}">
+                <a16:creationId xmlns:a16="http://schemas.microsoft.com/office/drawing/2014/main" id="{A7C919EB-5E81-F4F3-6E9B-D138E9AEC4AE}"/>
+              </a:ext>
+            </a:extLst>
+          </p:cNvPr>
+          <p:cNvSpPr>
+            <a:spLocks noGrp="1"/>
+          </p:cNvSpPr>
+          <p:nvPr>
+            <p:ph sz="quarter" idx="11"/>
+          </p:nvPr>
+        </p:nvSpPr>
+        <p:spPr/>
+        <p:txBody>
+          <a:bodyPr>
+            <a:normAutofit/>
+          </a:bodyPr>
+          <a:lstStyle/>
+          <a:p>
+            <a:pPr>
+              <a:buFont typeface="System Font Regular"/>
+              <a:buChar char="📚"/>
+            </a:pPr>
+            <a:r>
+              <a:rPr lang="en-US" dirty="0"/>
+              <a:t> To train a neural network from scratch, lots of data is needed</a:t>
+            </a:r>
+          </a:p>
+          <a:p>
+            <a:pPr>
+              <a:buFont typeface="System Font Regular"/>
+              <a:buChar char="🏋️"/>
+            </a:pPr>
+            <a:r>
+              <a:rPr lang="en-US" dirty="0"/>
+              <a:t> Many pre-trained networks are available online, especially in:</a:t>
+            </a:r>
+          </a:p>
+          <a:p>
+            <a:pPr lvl="1">
+              <a:buFont typeface="System Font Regular"/>
+              <a:buChar char="👁️"/>
+            </a:pPr>
+            <a:r>
+              <a:rPr lang="en-US" dirty="0"/>
+              <a:t> Computer vision</a:t>
+            </a:r>
+          </a:p>
+          <a:p>
+            <a:pPr lvl="1">
+              <a:buFont typeface="System Font Regular"/>
+              <a:buChar char="📖"/>
+            </a:pPr>
+            <a:r>
+              <a:rPr lang="en-US" dirty="0"/>
+              <a:t> Natural Language Processing</a:t>
+            </a:r>
+          </a:p>
+          <a:p>
+            <a:pPr marL="460375" indent="-450850">
+              <a:buFont typeface="System Font Regular"/>
+              <a:buChar char="🎓"/>
+            </a:pPr>
+            <a:r>
+              <a:rPr lang="en-US" dirty="0"/>
+              <a:t>Transfer learning can adapt a pre-trained neural network to a new problem</a:t>
+            </a:r>
+          </a:p>
+        </p:txBody>
+      </p:sp>
+      <p:sp>
+        <p:nvSpPr>
+          <p:cNvPr id="3" name="Title 2">
+            <a:extLst>
+              <a:ext uri="{FF2B5EF4-FFF2-40B4-BE49-F238E27FC236}">
+                <a16:creationId xmlns:a16="http://schemas.microsoft.com/office/drawing/2014/main" id="{4311126D-03FA-CDED-5617-B50F11413CAD}"/>
+              </a:ext>
+            </a:extLst>
+          </p:cNvPr>
+          <p:cNvSpPr>
+            <a:spLocks noGrp="1"/>
+          </p:cNvSpPr>
+          <p:nvPr>
+            <p:ph type="title"/>
+          </p:nvPr>
+        </p:nvSpPr>
+        <p:spPr/>
+        <p:txBody>
+          <a:bodyPr>
+            <a:normAutofit/>
+          </a:bodyPr>
+          <a:lstStyle/>
+          <a:p>
+            <a:r>
+              <a:rPr lang="en-US" dirty="0"/>
+              <a:t>Considerations about neural networks</a:t>
+            </a:r>
+          </a:p>
+        </p:txBody>
+      </p:sp>
+      <p:sp>
+        <p:nvSpPr>
+          <p:cNvPr id="4" name="Slide Number Placeholder 3">
+            <a:extLst>
+              <a:ext uri="{FF2B5EF4-FFF2-40B4-BE49-F238E27FC236}">
+                <a16:creationId xmlns:a16="http://schemas.microsoft.com/office/drawing/2014/main" id="{C5A70088-0E73-BA91-B45F-9B5F7BA6AF07}"/>
+              </a:ext>
+            </a:extLst>
+          </p:cNvPr>
+          <p:cNvSpPr>
+            <a:spLocks noGrp="1"/>
+          </p:cNvSpPr>
+          <p:nvPr>
+            <p:ph type="sldNum" sz="quarter" idx="13"/>
+          </p:nvPr>
+        </p:nvSpPr>
+        <p:spPr/>
+        <p:txBody>
+          <a:bodyPr/>
+          <a:lstStyle/>
+          <a:p>
+            <a:fld id="{E917DE0E-AFB1-41FD-BC35-27DB61CA125F}" type="slidenum">
+              <a:rPr lang="en-AU" smtClean="0"/>
+              <a:pPr/>
+              <a:t>5</a:t>
+            </a:fld>
+            <a:endParaRPr lang="en-AU" dirty="0"/>
+          </a:p>
+        </p:txBody>
+      </p:sp>
+      <p:sp>
+        <p:nvSpPr>
+          <p:cNvPr id="2" name="Footer Placeholder 5">
+            <a:extLst>
+              <a:ext uri="{FF2B5EF4-FFF2-40B4-BE49-F238E27FC236}">
+                <a16:creationId xmlns:a16="http://schemas.microsoft.com/office/drawing/2014/main" id="{491DE026-86E9-B5D3-A012-B5FAF833D4A0}"/>
+              </a:ext>
+            </a:extLst>
+          </p:cNvPr>
+          <p:cNvSpPr>
+            <a:spLocks noGrp="1"/>
+          </p:cNvSpPr>
+          <p:nvPr>
+            <p:ph type="ftr" sz="quarter" idx="12"/>
+          </p:nvPr>
+        </p:nvSpPr>
+        <p:spPr>
+          <a:xfrm>
+            <a:off x="2383047" y="184261"/>
+            <a:ext cx="7425906" cy="217125"/>
+          </a:xfrm>
+        </p:spPr>
+        <p:txBody>
+          <a:bodyPr/>
+          <a:lstStyle/>
+          <a:p>
+            <a:r>
+              <a:rPr lang="en-AU" dirty="0"/>
+              <a:t>Intro to PyTorch</a:t>
+            </a:r>
+          </a:p>
+        </p:txBody>
+      </p:sp>
+    </p:spTree>
+    <p:extLst>
+      <p:ext uri="{BB962C8B-B14F-4D97-AF65-F5344CB8AC3E}">
+        <p14:creationId xmlns:p14="http://schemas.microsoft.com/office/powerpoint/2010/main" val="1196549917"/>
+      </p:ext>
+    </p:extLst>
+  </p:cSld>
+  <p:clrMapOvr>
+    <a:masterClrMapping/>
+  </p:clrMapOvr>
+  <mc:AlternateContent xmlns:mc="http://schemas.openxmlformats.org/markup-compatibility/2006">
+    <mc:Choice xmlns:p14="http://schemas.microsoft.com/office/powerpoint/2010/main" Requires="p14">
+      <p:transition spd="med" p14:dur="700">
+        <p:fade/>
+      </p:transition>
+    </mc:Choice>
+    <mc:Fallback>
+      <p:transition spd="med">
+        <p:fade/>
+      </p:transition>
+    </mc:Fallback>
+  </mc:AlternateContent>
+  <p:timing>
+    <p:tnLst>
+      <p:par>
+        <p:cTn id="1" dur="indefinite" restart="never" nodeType="tmRoot">
+          <p:childTnLst>
+            <p:seq concurrent="1" nextAc="seek">
+              <p:cTn id="2" dur="indefinite" nodeType="mainSeq">
+                <p:childTnLst>
+                  <p:par>
+                    <p:cTn id="3" fill="hold">
+                      <p:stCondLst>
+                        <p:cond delay="indefinite"/>
+                      </p:stCondLst>
+                      <p:childTnLst>
+                        <p:par>
+                          <p:cTn id="4" fill="hold">
+                            <p:stCondLst>
+                              <p:cond delay="0"/>
+                            </p:stCondLst>
+                            <p:childTnLst>
+                              <p:par>
+                                <p:cTn id="5" presetID="10" presetClass="entr" presetSubtype="0" fill="hold" grpId="0" nodeType="clickEffect">
+                                  <p:stCondLst>
+                                    <p:cond delay="0"/>
+                                  </p:stCondLst>
+                                  <p:childTnLst>
+                                    <p:set>
+                                      <p:cBhvr>
+                                        <p:cTn id="6" dur="1" fill="hold">
+                                          <p:stCondLst>
+                                            <p:cond delay="0"/>
+                                          </p:stCondLst>
+                                        </p:cTn>
+                                        <p:tgtEl>
+                                          <p:spTgt spid="5">
+                                            <p:txEl>
+                                              <p:pRg st="0" end="0"/>
+                                            </p:txEl>
+                                          </p:spTgt>
+                                        </p:tgtEl>
+                                        <p:attrNameLst>
+                                          <p:attrName>style.visibility</p:attrName>
+                                        </p:attrNameLst>
+                                      </p:cBhvr>
+                                      <p:to>
+                                        <p:strVal val="visible"/>
+                                      </p:to>
+                                    </p:set>
+                                    <p:animEffect transition="in" filter="fade">
+                                      <p:cBhvr>
+                                        <p:cTn id="7" dur="500"/>
+                                        <p:tgtEl>
+                                          <p:spTgt spid="5">
+                                            <p:txEl>
+                                              <p:pRg st="0" end="0"/>
+                                            </p:txEl>
+                                          </p:spTgt>
+                                        </p:tgtEl>
+                                      </p:cBhvr>
+                                    </p:animEffect>
+                                  </p:childTnLst>
+                                </p:cTn>
+                              </p:par>
+                            </p:childTnLst>
+                          </p:cTn>
+                        </p:par>
+                      </p:childTnLst>
+                    </p:cTn>
+                  </p:par>
+                  <p:par>
+                    <p:cTn id="8" fill="hold">
+                      <p:stCondLst>
+                        <p:cond delay="indefinite"/>
+                      </p:stCondLst>
+                      <p:childTnLst>
+                        <p:par>
+                          <p:cTn id="9" fill="hold">
+                            <p:stCondLst>
+                              <p:cond delay="0"/>
+                            </p:stCondLst>
+                            <p:childTnLst>
+                              <p:par>
+                                <p:cTn id="10" presetID="10" presetClass="entr" presetSubtype="0" fill="hold" grpId="0" nodeType="clickEffect">
+                                  <p:stCondLst>
+                                    <p:cond delay="0"/>
+                                  </p:stCondLst>
+                                  <p:childTnLst>
+                                    <p:set>
+                                      <p:cBhvr>
+                                        <p:cTn id="11" dur="1" fill="hold">
+                                          <p:stCondLst>
+                                            <p:cond delay="0"/>
+                                          </p:stCondLst>
+                                        </p:cTn>
+                                        <p:tgtEl>
+                                          <p:spTgt spid="5">
+                                            <p:txEl>
+                                              <p:pRg st="1" end="1"/>
+                                            </p:txEl>
+                                          </p:spTgt>
+                                        </p:tgtEl>
+                                        <p:attrNameLst>
+                                          <p:attrName>style.visibility</p:attrName>
+                                        </p:attrNameLst>
+                                      </p:cBhvr>
+                                      <p:to>
+                                        <p:strVal val="visible"/>
+                                      </p:to>
+                                    </p:set>
+                                    <p:animEffect transition="in" filter="fade">
+                                      <p:cBhvr>
+                                        <p:cTn id="12" dur="500"/>
+                                        <p:tgtEl>
+                                          <p:spTgt spid="5">
+                                            <p:txEl>
+                                              <p:pRg st="1" end="1"/>
+                                            </p:txEl>
+                                          </p:spTgt>
+                                        </p:tgtEl>
+                                      </p:cBhvr>
+                                    </p:animEffect>
+                                  </p:childTnLst>
+                                </p:cTn>
+                              </p:par>
+                              <p:par>
+                                <p:cTn id="13" presetID="10" presetClass="entr" presetSubtype="0" fill="hold" grpId="0" nodeType="withEffect">
+                                  <p:stCondLst>
+                                    <p:cond delay="0"/>
+                                  </p:stCondLst>
+                                  <p:childTnLst>
+                                    <p:set>
+                                      <p:cBhvr>
+                                        <p:cTn id="14" dur="1" fill="hold">
+                                          <p:stCondLst>
+                                            <p:cond delay="0"/>
+                                          </p:stCondLst>
+                                        </p:cTn>
+                                        <p:tgtEl>
+                                          <p:spTgt spid="5">
+                                            <p:txEl>
+                                              <p:pRg st="2" end="2"/>
+                                            </p:txEl>
+                                          </p:spTgt>
+                                        </p:tgtEl>
+                                        <p:attrNameLst>
+                                          <p:attrName>style.visibility</p:attrName>
+                                        </p:attrNameLst>
+                                      </p:cBhvr>
+                                      <p:to>
+                                        <p:strVal val="visible"/>
+                                      </p:to>
+                                    </p:set>
+                                    <p:animEffect transition="in" filter="fade">
+                                      <p:cBhvr>
+                                        <p:cTn id="15" dur="500"/>
+                                        <p:tgtEl>
+                                          <p:spTgt spid="5">
+                                            <p:txEl>
+                                              <p:pRg st="2" end="2"/>
+                                            </p:txEl>
+                                          </p:spTgt>
+                                        </p:tgtEl>
+                                      </p:cBhvr>
+                                    </p:animEffect>
+                                  </p:childTnLst>
+                                </p:cTn>
+                              </p:par>
+                              <p:par>
+                                <p:cTn id="16" presetID="10" presetClass="entr" presetSubtype="0" fill="hold" grpId="0" nodeType="withEffect">
+                                  <p:stCondLst>
+                                    <p:cond delay="0"/>
+                                  </p:stCondLst>
+                                  <p:childTnLst>
+                                    <p:set>
+                                      <p:cBhvr>
+                                        <p:cTn id="17" dur="1" fill="hold">
+                                          <p:stCondLst>
+                                            <p:cond delay="0"/>
+                                          </p:stCondLst>
+                                        </p:cTn>
+                                        <p:tgtEl>
+                                          <p:spTgt spid="5">
+                                            <p:txEl>
+                                              <p:pRg st="3" end="3"/>
+                                            </p:txEl>
+                                          </p:spTgt>
+                                        </p:tgtEl>
+                                        <p:attrNameLst>
+                                          <p:attrName>style.visibility</p:attrName>
+                                        </p:attrNameLst>
+                                      </p:cBhvr>
+                                      <p:to>
+                                        <p:strVal val="visible"/>
+                                      </p:to>
+                                    </p:set>
+                                    <p:animEffect transition="in" filter="fade">
+                                      <p:cBhvr>
+                                        <p:cTn id="18" dur="500"/>
+                                        <p:tgtEl>
+                                          <p:spTgt spid="5">
+                                            <p:txEl>
+                                              <p:pRg st="3" end="3"/>
+                                            </p:txEl>
+                                          </p:spTgt>
+                                        </p:tgtEl>
+                                      </p:cBhvr>
+                                    </p:animEffect>
+                                  </p:childTnLst>
+                                </p:cTn>
+                              </p:par>
+                            </p:childTnLst>
+                          </p:cTn>
+                        </p:par>
+                      </p:childTnLst>
+                    </p:cTn>
+                  </p:par>
+                  <p:par>
+                    <p:cTn id="19" fill="hold">
+                      <p:stCondLst>
+                        <p:cond delay="indefinite"/>
+                      </p:stCondLst>
+                      <p:childTnLst>
+                        <p:par>
+                          <p:cTn id="20" fill="hold">
+                            <p:stCondLst>
+                              <p:cond delay="0"/>
+                            </p:stCondLst>
+                            <p:childTnLst>
+                              <p:par>
+                                <p:cTn id="21" presetID="10" presetClass="entr" presetSubtype="0" fill="hold" grpId="0" nodeType="clickEffect">
+                                  <p:stCondLst>
+                                    <p:cond delay="0"/>
+                                  </p:stCondLst>
+                                  <p:childTnLst>
+                                    <p:set>
+                                      <p:cBhvr>
+                                        <p:cTn id="22" dur="1" fill="hold">
+                                          <p:stCondLst>
+                                            <p:cond delay="0"/>
+                                          </p:stCondLst>
+                                        </p:cTn>
+                                        <p:tgtEl>
+                                          <p:spTgt spid="5">
+                                            <p:txEl>
+                                              <p:pRg st="4" end="4"/>
+                                            </p:txEl>
+                                          </p:spTgt>
+                                        </p:tgtEl>
+                                        <p:attrNameLst>
+                                          <p:attrName>style.visibility</p:attrName>
+                                        </p:attrNameLst>
+                                      </p:cBhvr>
+                                      <p:to>
+                                        <p:strVal val="visible"/>
+                                      </p:to>
+                                    </p:set>
+                                    <p:animEffect transition="in" filter="fade">
+                                      <p:cBhvr>
+                                        <p:cTn id="23" dur="500"/>
+                                        <p:tgtEl>
+                                          <p:spTgt spid="5">
+                                            <p:txEl>
+                                              <p:pRg st="4" end="4"/>
+                                            </p:txEl>
+                                          </p:spTgt>
+                                        </p:tgtEl>
+                                      </p:cBhvr>
+                                    </p:animEffect>
+                                  </p:childTnLst>
+                                </p:cTn>
+                              </p:par>
+                            </p:childTnLst>
+                          </p:cTn>
+                        </p:par>
+                      </p:childTnLst>
+                    </p:cTn>
+                  </p:par>
+                </p:childTnLst>
+              </p:cTn>
+              <p:prevCondLst>
+                <p:cond evt="onPrev" delay="0">
+                  <p:tgtEl>
+                    <p:sldTgt/>
+                  </p:tgtEl>
+                </p:cond>
+              </p:prevCondLst>
+              <p:nextCondLst>
+                <p:cond evt="onNext" delay="0">
+                  <p:tgtEl>
+                    <p:sldTgt/>
+                  </p:tgtEl>
+                </p:cond>
+              </p:nextCondLst>
+            </p:seq>
+          </p:childTnLst>
+        </p:cTn>
+      </p:par>
+    </p:tnLst>
+    <p:bldLst>
+      <p:bldP spid="5" grpId="0" build="p"/>
+    </p:bldLst>
+  </p:timing>
+</p:sld>
+</file>
+
+<file path=ppt/slides/slide6.xml><?xml version="1.0" encoding="utf-8"?>
+<p:sld xmlns:a="http://schemas.openxmlformats.org/drawingml/2006/main" xmlns:r="http://schemas.openxmlformats.org/officeDocument/2006/relationships" xmlns:p="http://schemas.openxmlformats.org/presentationml/2006/main">
+  <p:cSld>
+    <p:spTree>
+      <p:nvGrpSpPr>
+        <p:cNvPr id="1" name=""/>
+        <p:cNvGrpSpPr/>
+        <p:nvPr/>
+      </p:nvGrpSpPr>
+      <p:grpSpPr>
+        <a:xfrm>
+          <a:off x="0" y="0"/>
+          <a:ext cx="0" cy="0"/>
+          <a:chOff x="0" y="0"/>
+          <a:chExt cx="0" cy="0"/>
+        </a:xfrm>
+      </p:grpSpPr>
+      <p:sp>
+        <p:nvSpPr>
           <p:cNvPr id="3" name="Content Placeholder 2"/>
           <p:cNvSpPr>
             <a:spLocks noGrp="1"/>
@@ -15687,7 +17066,7 @@
             <a:fld id="{E917DE0E-AFB1-41FD-BC35-27DB61CA125F}" type="slidenum">
               <a:rPr lang="en-AU" smtClean="0"/>
               <a:pPr/>
-              <a:t>4</a:t>
+              <a:t>6</a:t>
             </a:fld>
             <a:endParaRPr lang="en-AU" dirty="0"/>
           </a:p>
@@ -15703,13 +17082,13 @@
   <p:clrMapOvr>
     <a:masterClrMapping/>
   </p:clrMapOvr>
-  <mc:AlternateContent xmlns:mc="http://schemas.openxmlformats.org/markup-compatibility/2006">
-    <mc:Choice xmlns:p14="http://schemas.microsoft.com/office/powerpoint/2010/main" Requires="p14">
+  <mc:AlternateContent xmlns:mc="http://schemas.openxmlformats.org/markup-compatibility/2006" xmlns:p14="http://schemas.microsoft.com/office/powerpoint/2010/main">
+    <mc:Choice Requires="p14">
       <p:transition spd="med" p14:dur="700">
         <p:fade/>
       </p:transition>
     </mc:Choice>
-    <mc:Fallback>
+    <mc:Fallback xmlns="">
       <p:transition spd="med">
         <p:fade/>
       </p:transition>
@@ -16221,7 +17600,7 @@
 </p:sld>
 </file>
 
-<file path=ppt/slides/slide5.xml><?xml version="1.0" encoding="utf-8"?>
+<file path=ppt/slides/slide7.xml><?xml version="1.0" encoding="utf-8"?>
 <p:sld xmlns:a="http://schemas.openxmlformats.org/drawingml/2006/main" xmlns:r="http://schemas.openxmlformats.org/officeDocument/2006/relationships" xmlns:p="http://schemas.openxmlformats.org/presentationml/2006/main">
   <p:cSld>
     <p:spTree>
@@ -16442,7 +17821,7 @@
             <a:fld id="{E917DE0E-AFB1-41FD-BC35-27DB61CA125F}" type="slidenum">
               <a:rPr lang="en-AU" smtClean="0"/>
               <a:pPr/>
-              <a:t>5</a:t>
+              <a:t>7</a:t>
             </a:fld>
             <a:endParaRPr lang="en-AU" dirty="0"/>
           </a:p>
@@ -16458,13 +17837,13 @@
   <p:clrMapOvr>
     <a:masterClrMapping/>
   </p:clrMapOvr>
-  <mc:AlternateContent xmlns:mc="http://schemas.openxmlformats.org/markup-compatibility/2006">
-    <mc:Choice xmlns:p14="http://schemas.microsoft.com/office/powerpoint/2010/main" Requires="p14">
+  <mc:AlternateContent xmlns:mc="http://schemas.openxmlformats.org/markup-compatibility/2006" xmlns:p14="http://schemas.microsoft.com/office/powerpoint/2010/main">
+    <mc:Choice Requires="p14">
       <p:transition spd="med" p14:dur="700">
         <p:fade/>
       </p:transition>
     </mc:Choice>
-    <mc:Fallback>
+    <mc:Fallback xmlns="">
       <p:transition spd="med">
         <p:fade/>
       </p:transition>
@@ -16689,7 +18068,7 @@
 </p:sld>
 </file>
 
-<file path=ppt/slides/slide6.xml><?xml version="1.0" encoding="utf-8"?>
+<file path=ppt/slides/slide8.xml><?xml version="1.0" encoding="utf-8"?>
 <p:sld xmlns:a="http://schemas.openxmlformats.org/drawingml/2006/main" xmlns:r="http://schemas.openxmlformats.org/officeDocument/2006/relationships" xmlns:p="http://schemas.openxmlformats.org/presentationml/2006/main">
   <p:cSld>
     <p:spTree>
@@ -16952,7 +18331,7 @@
             <a:fld id="{E917DE0E-AFB1-41FD-BC35-27DB61CA125F}" type="slidenum">
               <a:rPr lang="en-AU" smtClean="0"/>
               <a:pPr/>
-              <a:t>6</a:t>
+              <a:t>8</a:t>
             </a:fld>
             <a:endParaRPr lang="en-AU" dirty="0"/>
           </a:p>
@@ -16968,13 +18347,13 @@
   <p:clrMapOvr>
     <a:masterClrMapping/>
   </p:clrMapOvr>
-  <mc:AlternateContent xmlns:mc="http://schemas.openxmlformats.org/markup-compatibility/2006">
-    <mc:Choice xmlns:p14="http://schemas.microsoft.com/office/powerpoint/2010/main" Requires="p14">
+  <mc:AlternateContent xmlns:mc="http://schemas.openxmlformats.org/markup-compatibility/2006" xmlns:p14="http://schemas.microsoft.com/office/powerpoint/2010/main">
+    <mc:Choice Requires="p14">
       <p:transition spd="med" p14:dur="700">
         <p:fade/>
       </p:transition>
     </mc:Choice>
-    <mc:Fallback>
+    <mc:Fallback xmlns="">
       <p:transition spd="med">
         <p:fade/>
       </p:transition>
@@ -17321,7 +18700,7 @@
 </p:sld>
 </file>
 
-<file path=ppt/slides/slide7.xml><?xml version="1.0" encoding="utf-8"?>
+<file path=ppt/slides/slide9.xml><?xml version="1.0" encoding="utf-8"?>
 <p:sld xmlns:a="http://schemas.openxmlformats.org/drawingml/2006/main" xmlns:r="http://schemas.openxmlformats.org/officeDocument/2006/relationships" xmlns:p="http://schemas.openxmlformats.org/presentationml/2006/main">
   <p:cSld>
     <p:spTree>
@@ -17545,7 +18924,7 @@
             <a:fld id="{E917DE0E-AFB1-41FD-BC35-27DB61CA125F}" type="slidenum">
               <a:rPr lang="en-AU" smtClean="0"/>
               <a:pPr/>
-              <a:t>7</a:t>
+              <a:t>9</a:t>
             </a:fld>
             <a:endParaRPr lang="en-AU" dirty="0"/>
           </a:p>
@@ -17698,13 +19077,13 @@
   <p:clrMapOvr>
     <a:masterClrMapping/>
   </p:clrMapOvr>
-  <mc:AlternateContent xmlns:mc="http://schemas.openxmlformats.org/markup-compatibility/2006">
-    <mc:Choice xmlns:p14="http://schemas.microsoft.com/office/powerpoint/2010/main" Requires="p14">
+  <mc:AlternateContent xmlns:mc="http://schemas.openxmlformats.org/markup-compatibility/2006" xmlns:p14="http://schemas.microsoft.com/office/powerpoint/2010/main">
+    <mc:Choice Requires="p14">
       <p:transition spd="med" p14:dur="700">
         <p:fade/>
       </p:transition>
     </mc:Choice>
-    <mc:Fallback>
+    <mc:Fallback xmlns="">
       <p:transition spd="med">
         <p:fade/>
       </p:transition>
@@ -18005,373 +19384,6 @@
       <p:bldP spid="2" grpId="0" uiExpand="1" build="p"/>
     </p:bldLst>
   </p:timing>
-</p:sld>
-</file>
-
-<file path=ppt/slides/slide8.xml><?xml version="1.0" encoding="utf-8"?>
-<p:sld xmlns:a="http://schemas.openxmlformats.org/drawingml/2006/main" xmlns:r="http://schemas.openxmlformats.org/officeDocument/2006/relationships" xmlns:p="http://schemas.openxmlformats.org/presentationml/2006/main">
-  <p:cSld>
-    <p:spTree>
-      <p:nvGrpSpPr>
-        <p:cNvPr id="1" name=""/>
-        <p:cNvGrpSpPr/>
-        <p:nvPr/>
-      </p:nvGrpSpPr>
-      <p:grpSpPr>
-        <a:xfrm>
-          <a:off x="0" y="0"/>
-          <a:ext cx="0" cy="0"/>
-          <a:chOff x="0" y="0"/>
-          <a:chExt cx="0" cy="0"/>
-        </a:xfrm>
-      </p:grpSpPr>
-      <p:sp>
-        <p:nvSpPr>
-          <p:cNvPr id="2" name="Content Placeholder 1">
-            <a:extLst>
-              <a:ext uri="{FF2B5EF4-FFF2-40B4-BE49-F238E27FC236}">
-                <a16:creationId xmlns:a16="http://schemas.microsoft.com/office/drawing/2014/main" id="{D47CAEB2-2A3D-DC5C-3574-8D79CBE07BB9}"/>
-              </a:ext>
-            </a:extLst>
-          </p:cNvPr>
-          <p:cNvSpPr>
-            <a:spLocks noGrp="1"/>
-          </p:cNvSpPr>
-          <p:nvPr>
-            <p:ph sz="quarter" idx="11"/>
-          </p:nvPr>
-        </p:nvSpPr>
-        <p:spPr/>
-        <p:txBody>
-          <a:bodyPr>
-            <a:normAutofit fontScale="85000" lnSpcReduction="20000"/>
-          </a:bodyPr>
-          <a:lstStyle/>
-          <a:p>
-            <a:pPr marL="0" indent="0">
-              <a:buNone/>
-            </a:pPr>
-            <a:r>
-              <a:rPr lang="en-US" dirty="0"/>
-              <a:t>Project website:</a:t>
-            </a:r>
-            <a:endParaRPr lang="en-US" dirty="0">
-              <a:hlinkClick r:id="rId2"/>
-            </a:endParaRPr>
-          </a:p>
-          <a:p>
-            <a:pPr marL="0" indent="0" algn="ctr">
-              <a:buNone/>
-            </a:pPr>
-            <a:r>
-              <a:rPr lang="en-US" dirty="0">
-                <a:hlinkClick r:id="rId3"/>
-              </a:rPr>
-              <a:t>https://pytorch.org/</a:t>
-            </a:r>
-            <a:endParaRPr lang="en-US" dirty="0"/>
-          </a:p>
-          <a:p>
-            <a:pPr marL="457200" indent="-457200"/>
-            <a:r>
-              <a:rPr lang="en-US" dirty="0"/>
-              <a:t>Installation guide</a:t>
-            </a:r>
-          </a:p>
-          <a:p>
-            <a:pPr marL="457200" indent="-457200"/>
-            <a:r>
-              <a:rPr lang="en-US" dirty="0"/>
-              <a:t>Good tutorials (sometimes outdated)</a:t>
-            </a:r>
-          </a:p>
-          <a:p>
-            <a:pPr marL="457200" indent="-457200"/>
-            <a:r>
-              <a:rPr lang="en-US" dirty="0"/>
-              <a:t>API reference</a:t>
-            </a:r>
-          </a:p>
-          <a:p>
-            <a:pPr marL="457200" indent="-457200"/>
-            <a:r>
-              <a:rPr lang="en-US" dirty="0"/>
-              <a:t>Examples</a:t>
-            </a:r>
-          </a:p>
-          <a:p>
-            <a:pPr marL="457200" indent="-457200"/>
-            <a:r>
-              <a:rPr lang="en-US" dirty="0"/>
-              <a:t>Community</a:t>
-            </a:r>
-          </a:p>
-          <a:p>
-            <a:pPr marL="457200" indent="-457200"/>
-            <a:r>
-              <a:rPr lang="en-US" dirty="0"/>
-              <a:t>…</a:t>
-            </a:r>
-          </a:p>
-          <a:p>
-            <a:pPr marL="0" indent="0" algn="ctr">
-              <a:buNone/>
-            </a:pPr>
-            <a:endParaRPr lang="en-US" dirty="0"/>
-          </a:p>
-          <a:p>
-            <a:endParaRPr lang="en-US" dirty="0"/>
-          </a:p>
-        </p:txBody>
-      </p:sp>
-      <p:sp>
-        <p:nvSpPr>
-          <p:cNvPr id="3" name="Title 2">
-            <a:extLst>
-              <a:ext uri="{FF2B5EF4-FFF2-40B4-BE49-F238E27FC236}">
-                <a16:creationId xmlns:a16="http://schemas.microsoft.com/office/drawing/2014/main" id="{56133F61-F965-7D00-90B8-B15BAE9FDF66}"/>
-              </a:ext>
-            </a:extLst>
-          </p:cNvPr>
-          <p:cNvSpPr>
-            <a:spLocks noGrp="1"/>
-          </p:cNvSpPr>
-          <p:nvPr>
-            <p:ph type="title"/>
-          </p:nvPr>
-        </p:nvSpPr>
-        <p:spPr/>
-        <p:txBody>
-          <a:bodyPr/>
-          <a:lstStyle/>
-          <a:p>
-            <a:r>
-              <a:rPr lang="en-US" dirty="0" err="1"/>
-              <a:t>PyTorch</a:t>
-            </a:r>
-            <a:r>
-              <a:rPr lang="en-US" dirty="0"/>
-              <a:t> at a glance</a:t>
-            </a:r>
-          </a:p>
-        </p:txBody>
-      </p:sp>
-      <p:sp>
-        <p:nvSpPr>
-          <p:cNvPr id="4" name="Footer Placeholder 3">
-            <a:extLst>
-              <a:ext uri="{FF2B5EF4-FFF2-40B4-BE49-F238E27FC236}">
-                <a16:creationId xmlns:a16="http://schemas.microsoft.com/office/drawing/2014/main" id="{81469498-3274-9CE5-0E60-8E948217173C}"/>
-              </a:ext>
-            </a:extLst>
-          </p:cNvPr>
-          <p:cNvSpPr>
-            <a:spLocks noGrp="1"/>
-          </p:cNvSpPr>
-          <p:nvPr>
-            <p:ph type="ftr" sz="quarter" idx="12"/>
-          </p:nvPr>
-        </p:nvSpPr>
-        <p:spPr/>
-        <p:txBody>
-          <a:bodyPr/>
-          <a:lstStyle/>
-          <a:p>
-            <a:pPr algn="ctr"/>
-            <a:r>
-              <a:rPr lang="en-AU" dirty="0"/>
-              <a:t>Intro to PyTorch</a:t>
-            </a:r>
-          </a:p>
-        </p:txBody>
-      </p:sp>
-      <p:sp>
-        <p:nvSpPr>
-          <p:cNvPr id="5" name="Slide Number Placeholder 4">
-            <a:extLst>
-              <a:ext uri="{FF2B5EF4-FFF2-40B4-BE49-F238E27FC236}">
-                <a16:creationId xmlns:a16="http://schemas.microsoft.com/office/drawing/2014/main" id="{E3369252-1038-5180-4BA4-C479494753E0}"/>
-              </a:ext>
-            </a:extLst>
-          </p:cNvPr>
-          <p:cNvSpPr>
-            <a:spLocks noGrp="1"/>
-          </p:cNvSpPr>
-          <p:nvPr>
-            <p:ph type="sldNum" sz="quarter" idx="13"/>
-          </p:nvPr>
-        </p:nvSpPr>
-        <p:spPr/>
-        <p:txBody>
-          <a:bodyPr/>
-          <a:lstStyle/>
-          <a:p>
-            <a:fld id="{E917DE0E-AFB1-41FD-BC35-27DB61CA125F}" type="slidenum">
-              <a:rPr lang="en-AU" smtClean="0"/>
-              <a:pPr/>
-              <a:t>8</a:t>
-            </a:fld>
-            <a:endParaRPr lang="en-AU" dirty="0"/>
-          </a:p>
-        </p:txBody>
-      </p:sp>
-    </p:spTree>
-    <p:extLst>
-      <p:ext uri="{BB962C8B-B14F-4D97-AF65-F5344CB8AC3E}">
-        <p14:creationId xmlns:p14="http://schemas.microsoft.com/office/powerpoint/2010/main" val="2818603005"/>
-      </p:ext>
-    </p:extLst>
-  </p:cSld>
-  <p:clrMapOvr>
-    <a:masterClrMapping/>
-  </p:clrMapOvr>
-  <mc:AlternateContent xmlns:mc="http://schemas.openxmlformats.org/markup-compatibility/2006">
-    <mc:Choice xmlns:p14="http://schemas.microsoft.com/office/powerpoint/2010/main" Requires="p14">
-      <p:transition spd="med" p14:dur="700">
-        <p:fade/>
-      </p:transition>
-    </mc:Choice>
-    <mc:Fallback>
-      <p:transition spd="med">
-        <p:fade/>
-      </p:transition>
-    </mc:Fallback>
-  </mc:AlternateContent>
-</p:sld>
-</file>
-
-<file path=ppt/slides/slide9.xml><?xml version="1.0" encoding="utf-8"?>
-<p:sld xmlns:a="http://schemas.openxmlformats.org/drawingml/2006/main" xmlns:r="http://schemas.openxmlformats.org/officeDocument/2006/relationships" xmlns:p="http://schemas.openxmlformats.org/presentationml/2006/main">
-  <p:cSld>
-    <p:spTree>
-      <p:nvGrpSpPr>
-        <p:cNvPr id="1" name=""/>
-        <p:cNvGrpSpPr/>
-        <p:nvPr/>
-      </p:nvGrpSpPr>
-      <p:grpSpPr>
-        <a:xfrm>
-          <a:off x="0" y="0"/>
-          <a:ext cx="0" cy="0"/>
-          <a:chOff x="0" y="0"/>
-          <a:chExt cx="0" cy="0"/>
-        </a:xfrm>
-      </p:grpSpPr>
-      <p:sp>
-        <p:nvSpPr>
-          <p:cNvPr id="10" name="Title 9">
-            <a:extLst>
-              <a:ext uri="{FF2B5EF4-FFF2-40B4-BE49-F238E27FC236}">
-                <a16:creationId xmlns:a16="http://schemas.microsoft.com/office/drawing/2014/main" id="{18D359ED-81E1-4152-B5FF-BC60446F6E05}"/>
-              </a:ext>
-            </a:extLst>
-          </p:cNvPr>
-          <p:cNvSpPr>
-            <a:spLocks noGrp="1"/>
-          </p:cNvSpPr>
-          <p:nvPr>
-            <p:ph type="title"/>
-          </p:nvPr>
-        </p:nvSpPr>
-        <p:spPr>
-          <a:xfrm>
-            <a:off x="381000" y="2772655"/>
-            <a:ext cx="10059418" cy="1312691"/>
-          </a:xfrm>
-        </p:spPr>
-        <p:txBody>
-          <a:bodyPr/>
-          <a:lstStyle/>
-          <a:p>
-            <a:pPr algn="l"/>
-            <a:r>
-              <a:rPr lang="en-AU" dirty="0"/>
-              <a:t>Let’s get started…</a:t>
-            </a:r>
-          </a:p>
-        </p:txBody>
-      </p:sp>
-      <p:sp>
-        <p:nvSpPr>
-          <p:cNvPr id="5" name="Footer Placeholder 4">
-            <a:extLst>
-              <a:ext uri="{FF2B5EF4-FFF2-40B4-BE49-F238E27FC236}">
-                <a16:creationId xmlns:a16="http://schemas.microsoft.com/office/drawing/2014/main" id="{2AB3A763-8648-4E79-A29B-28D21C7710A9}"/>
-              </a:ext>
-            </a:extLst>
-          </p:cNvPr>
-          <p:cNvSpPr>
-            <a:spLocks noGrp="1"/>
-          </p:cNvSpPr>
-          <p:nvPr>
-            <p:ph type="ftr" sz="quarter" idx="11"/>
-          </p:nvPr>
-        </p:nvSpPr>
-        <p:spPr/>
-        <p:txBody>
-          <a:bodyPr/>
-          <a:lstStyle/>
-          <a:p>
-            <a:pPr algn="ctr"/>
-            <a:r>
-              <a:rPr lang="en-AU" dirty="0"/>
-              <a:t>Intro to PyTorch</a:t>
-            </a:r>
-          </a:p>
-        </p:txBody>
-      </p:sp>
-      <p:sp>
-        <p:nvSpPr>
-          <p:cNvPr id="6" name="Slide Number Placeholder 5">
-            <a:extLst>
-              <a:ext uri="{FF2B5EF4-FFF2-40B4-BE49-F238E27FC236}">
-                <a16:creationId xmlns:a16="http://schemas.microsoft.com/office/drawing/2014/main" id="{8BE61673-B619-48AC-86E7-428A4A84EFC8}"/>
-              </a:ext>
-            </a:extLst>
-          </p:cNvPr>
-          <p:cNvSpPr>
-            <a:spLocks noGrp="1"/>
-          </p:cNvSpPr>
-          <p:nvPr>
-            <p:ph type="sldNum" sz="quarter" idx="12"/>
-          </p:nvPr>
-        </p:nvSpPr>
-        <p:spPr/>
-        <p:txBody>
-          <a:bodyPr/>
-          <a:lstStyle/>
-          <a:p>
-            <a:fld id="{E917DE0E-AFB1-41FD-BC35-27DB61CA125F}" type="slidenum">
-              <a:rPr lang="en-AU" smtClean="0"/>
-              <a:pPr/>
-              <a:t>9</a:t>
-            </a:fld>
-            <a:endParaRPr lang="en-AU" dirty="0"/>
-          </a:p>
-        </p:txBody>
-      </p:sp>
-    </p:spTree>
-    <p:extLst>
-      <p:ext uri="{BB962C8B-B14F-4D97-AF65-F5344CB8AC3E}">
-        <p14:creationId xmlns:p14="http://schemas.microsoft.com/office/powerpoint/2010/main" val="2185817615"/>
-      </p:ext>
-    </p:extLst>
-  </p:cSld>
-  <p:clrMapOvr>
-    <a:masterClrMapping/>
-  </p:clrMapOvr>
-  <mc:AlternateContent xmlns:mc="http://schemas.openxmlformats.org/markup-compatibility/2006">
-    <mc:Choice xmlns:p14="http://schemas.microsoft.com/office/powerpoint/2010/main" Requires="p14">
-      <p:transition spd="med" p14:dur="700">
-        <p:fade/>
-      </p:transition>
-    </mc:Choice>
-    <mc:Fallback>
-      <p:transition spd="med">
-        <p:fade/>
-      </p:transition>
-    </mc:Fallback>
-  </mc:AlternateContent>
 </p:sld>
 </file>
 

</xml_diff>